<commit_message>
More appropriate landing graphic
</commit_message>
<xml_diff>
--- a/fig/ws-backup-macos-v01g.pptx
+++ b/fig/ws-backup-macos-v01g.pptx
@@ -288,7 +288,7 @@
           <a:p>
             <a:fld id="{6EEA7111-AD52-9947-B6F0-32AC9A625913}" type="datetimeFigureOut">
               <a:rPr lang="en-US" smtClean="0"/>
-              <a:t>6/19/16</a:t>
+              <a:t>6/21/16</a:t>
             </a:fld>
             <a:endParaRPr lang="en-US"/>
           </a:p>
@@ -458,7 +458,7 @@
           <a:p>
             <a:fld id="{6EEA7111-AD52-9947-B6F0-32AC9A625913}" type="datetimeFigureOut">
               <a:rPr lang="en-US" smtClean="0"/>
-              <a:t>6/19/16</a:t>
+              <a:t>6/21/16</a:t>
             </a:fld>
             <a:endParaRPr lang="en-US"/>
           </a:p>
@@ -638,7 +638,7 @@
           <a:p>
             <a:fld id="{6EEA7111-AD52-9947-B6F0-32AC9A625913}" type="datetimeFigureOut">
               <a:rPr lang="en-US" smtClean="0"/>
-              <a:t>6/19/16</a:t>
+              <a:t>6/21/16</a:t>
             </a:fld>
             <a:endParaRPr lang="en-US"/>
           </a:p>
@@ -808,7 +808,7 @@
           <a:p>
             <a:fld id="{6EEA7111-AD52-9947-B6F0-32AC9A625913}" type="datetimeFigureOut">
               <a:rPr lang="en-US" smtClean="0"/>
-              <a:t>6/19/16</a:t>
+              <a:t>6/21/16</a:t>
             </a:fld>
             <a:endParaRPr lang="en-US"/>
           </a:p>
@@ -1054,7 +1054,7 @@
           <a:p>
             <a:fld id="{6EEA7111-AD52-9947-B6F0-32AC9A625913}" type="datetimeFigureOut">
               <a:rPr lang="en-US" smtClean="0"/>
-              <a:t>6/19/16</a:t>
+              <a:t>6/21/16</a:t>
             </a:fld>
             <a:endParaRPr lang="en-US"/>
           </a:p>
@@ -1342,7 +1342,7 @@
           <a:p>
             <a:fld id="{6EEA7111-AD52-9947-B6F0-32AC9A625913}" type="datetimeFigureOut">
               <a:rPr lang="en-US" smtClean="0"/>
-              <a:t>6/19/16</a:t>
+              <a:t>6/21/16</a:t>
             </a:fld>
             <a:endParaRPr lang="en-US"/>
           </a:p>
@@ -1764,7 +1764,7 @@
           <a:p>
             <a:fld id="{6EEA7111-AD52-9947-B6F0-32AC9A625913}" type="datetimeFigureOut">
               <a:rPr lang="en-US" smtClean="0"/>
-              <a:t>6/19/16</a:t>
+              <a:t>6/21/16</a:t>
             </a:fld>
             <a:endParaRPr lang="en-US"/>
           </a:p>
@@ -1882,7 +1882,7 @@
           <a:p>
             <a:fld id="{6EEA7111-AD52-9947-B6F0-32AC9A625913}" type="datetimeFigureOut">
               <a:rPr lang="en-US" smtClean="0"/>
-              <a:t>6/19/16</a:t>
+              <a:t>6/21/16</a:t>
             </a:fld>
             <a:endParaRPr lang="en-US"/>
           </a:p>
@@ -1977,7 +1977,7 @@
           <a:p>
             <a:fld id="{6EEA7111-AD52-9947-B6F0-32AC9A625913}" type="datetimeFigureOut">
               <a:rPr lang="en-US" smtClean="0"/>
-              <a:t>6/19/16</a:t>
+              <a:t>6/21/16</a:t>
             </a:fld>
             <a:endParaRPr lang="en-US"/>
           </a:p>
@@ -2254,7 +2254,7 @@
           <a:p>
             <a:fld id="{6EEA7111-AD52-9947-B6F0-32AC9A625913}" type="datetimeFigureOut">
               <a:rPr lang="en-US" smtClean="0"/>
-              <a:t>6/19/16</a:t>
+              <a:t>6/21/16</a:t>
             </a:fld>
             <a:endParaRPr lang="en-US"/>
           </a:p>
@@ -2507,7 +2507,7 @@
           <a:p>
             <a:fld id="{6EEA7111-AD52-9947-B6F0-32AC9A625913}" type="datetimeFigureOut">
               <a:rPr lang="en-US" smtClean="0"/>
-              <a:t>6/19/16</a:t>
+              <a:t>6/21/16</a:t>
             </a:fld>
             <a:endParaRPr lang="en-US"/>
           </a:p>
@@ -2720,7 +2720,7 @@
           <a:p>
             <a:fld id="{6EEA7111-AD52-9947-B6F0-32AC9A625913}" type="datetimeFigureOut">
               <a:rPr lang="en-US" smtClean="0"/>
-              <a:t>6/19/16</a:t>
+              <a:t>6/21/16</a:t>
             </a:fld>
             <a:endParaRPr lang="en-US"/>
           </a:p>
@@ -5831,14 +5831,13 @@
           <p:cNvPr id="69" name="Straight Connector 68"/>
           <p:cNvCxnSpPr>
             <a:stCxn id="65" idx="1"/>
-            <a:endCxn id="58" idx="3"/>
           </p:cNvCxnSpPr>
           <p:nvPr/>
         </p:nvCxnSpPr>
         <p:spPr>
           <a:xfrm flipH="1">
-            <a:off x="4358887" y="1357444"/>
-            <a:ext cx="2669971" cy="188128"/>
+            <a:off x="4683341" y="1357444"/>
+            <a:ext cx="2345517" cy="120040"/>
           </a:xfrm>
           <a:prstGeom prst="line">
             <a:avLst/>
@@ -7471,18 +7470,6 @@
               </a:rPr>
               <a:t>backup-v01g</a:t>
             </a:r>
-            <a:r>
-              <a:rPr lang="en-US" sz="600" dirty="0" smtClean="0">
-                <a:solidFill>
-                  <a:schemeClr val="bg1">
-                    <a:lumMod val="75000"/>
-                  </a:schemeClr>
-                </a:solidFill>
-                <a:latin typeface="Open Sans Light"/>
-                <a:cs typeface="Open Sans Light"/>
-              </a:rPr>
-              <a:t/>
-            </a:r>
             <a:br>
               <a:rPr lang="en-US" sz="600" dirty="0" smtClean="0">
                 <a:solidFill>
@@ -7504,31 +7491,7 @@
                 <a:latin typeface="Open Sans Light"/>
                 <a:cs typeface="Open Sans Light"/>
               </a:rPr>
-              <a:t>Copyright 2016 Wilson </a:t>
-            </a:r>
-            <a:r>
-              <a:rPr lang="en-US" sz="600" dirty="0" smtClean="0">
-                <a:solidFill>
-                  <a:schemeClr val="bg1">
-                    <a:lumMod val="75000"/>
-                  </a:schemeClr>
-                </a:solidFill>
-                <a:latin typeface="Open Sans Light"/>
-                <a:cs typeface="Open Sans Light"/>
-              </a:rPr>
-              <a:t>Mar </a:t>
-            </a:r>
-            <a:r>
-              <a:rPr lang="en-US" sz="600" dirty="0" smtClean="0">
-                <a:solidFill>
-                  <a:schemeClr val="bg1">
-                    <a:lumMod val="75000"/>
-                  </a:schemeClr>
-                </a:solidFill>
-                <a:latin typeface="Open Sans Light"/>
-                <a:cs typeface="Open Sans Light"/>
-              </a:rPr>
-              <a:t/>
+              <a:t>Copyright 2016 Wilson Mar </a:t>
             </a:r>
             <a:br>
               <a:rPr lang="en-US" sz="600" dirty="0" smtClean="0">
@@ -7551,19 +7514,7 @@
                 <a:latin typeface="Open Sans Light"/>
                 <a:cs typeface="Open Sans Light"/>
               </a:rPr>
-              <a:t>All rights </a:t>
-            </a:r>
-            <a:r>
-              <a:rPr lang="en-US" sz="600" dirty="0" smtClean="0">
-                <a:solidFill>
-                  <a:schemeClr val="bg1">
-                    <a:lumMod val="75000"/>
-                  </a:schemeClr>
-                </a:solidFill>
-                <a:latin typeface="Open Sans Light"/>
-                <a:cs typeface="Open Sans Light"/>
-              </a:rPr>
-              <a:t>reserved</a:t>
+              <a:t>All rights reserved</a:t>
             </a:r>
             <a:endParaRPr lang="en-US" sz="600" dirty="0">
               <a:solidFill>

</xml_diff>